<commit_message>
Added in fitness effect on protection
</commit_message>
<xml_diff>
--- a/code_links.pptx
+++ b/code_links.pptx
@@ -6,6 +6,7 @@
   </p:sldMasterIdLst>
   <p:sldIdLst>
     <p:sldId id="256" r:id="rId2"/>
+    <p:sldId id="257" r:id="rId3"/>
   </p:sldIdLst>
   <p:sldSz cx="12192000" cy="6858000"/>
   <p:notesSz cx="6858000" cy="9144000"/>
@@ -261,7 +262,7 @@
           <a:p>
             <a:fld id="{8651ECA8-23E8-9342-AD68-A2BD7DFE0D48}" type="datetimeFigureOut">
               <a:rPr lang="en-GB" smtClean="0"/>
-              <a:t>23/08/2018</a:t>
+              <a:t>21/09/2018</a:t>
             </a:fld>
             <a:endParaRPr lang="en-GB"/>
           </a:p>
@@ -461,7 +462,7 @@
           <a:p>
             <a:fld id="{8651ECA8-23E8-9342-AD68-A2BD7DFE0D48}" type="datetimeFigureOut">
               <a:rPr lang="en-GB" smtClean="0"/>
-              <a:t>23/08/2018</a:t>
+              <a:t>21/09/2018</a:t>
             </a:fld>
             <a:endParaRPr lang="en-GB"/>
           </a:p>
@@ -671,7 +672,7 @@
           <a:p>
             <a:fld id="{8651ECA8-23E8-9342-AD68-A2BD7DFE0D48}" type="datetimeFigureOut">
               <a:rPr lang="en-GB" smtClean="0"/>
-              <a:t>23/08/2018</a:t>
+              <a:t>21/09/2018</a:t>
             </a:fld>
             <a:endParaRPr lang="en-GB"/>
           </a:p>
@@ -871,7 +872,7 @@
           <a:p>
             <a:fld id="{8651ECA8-23E8-9342-AD68-A2BD7DFE0D48}" type="datetimeFigureOut">
               <a:rPr lang="en-GB" smtClean="0"/>
-              <a:t>23/08/2018</a:t>
+              <a:t>21/09/2018</a:t>
             </a:fld>
             <a:endParaRPr lang="en-GB"/>
           </a:p>
@@ -1147,7 +1148,7 @@
           <a:p>
             <a:fld id="{8651ECA8-23E8-9342-AD68-A2BD7DFE0D48}" type="datetimeFigureOut">
               <a:rPr lang="en-GB" smtClean="0"/>
-              <a:t>23/08/2018</a:t>
+              <a:t>21/09/2018</a:t>
             </a:fld>
             <a:endParaRPr lang="en-GB"/>
           </a:p>
@@ -1415,7 +1416,7 @@
           <a:p>
             <a:fld id="{8651ECA8-23E8-9342-AD68-A2BD7DFE0D48}" type="datetimeFigureOut">
               <a:rPr lang="en-GB" smtClean="0"/>
-              <a:t>23/08/2018</a:t>
+              <a:t>21/09/2018</a:t>
             </a:fld>
             <a:endParaRPr lang="en-GB"/>
           </a:p>
@@ -1830,7 +1831,7 @@
           <a:p>
             <a:fld id="{8651ECA8-23E8-9342-AD68-A2BD7DFE0D48}" type="datetimeFigureOut">
               <a:rPr lang="en-GB" smtClean="0"/>
-              <a:t>23/08/2018</a:t>
+              <a:t>21/09/2018</a:t>
             </a:fld>
             <a:endParaRPr lang="en-GB"/>
           </a:p>
@@ -1972,7 +1973,7 @@
           <a:p>
             <a:fld id="{8651ECA8-23E8-9342-AD68-A2BD7DFE0D48}" type="datetimeFigureOut">
               <a:rPr lang="en-GB" smtClean="0"/>
-              <a:t>23/08/2018</a:t>
+              <a:t>21/09/2018</a:t>
             </a:fld>
             <a:endParaRPr lang="en-GB"/>
           </a:p>
@@ -2085,7 +2086,7 @@
           <a:p>
             <a:fld id="{8651ECA8-23E8-9342-AD68-A2BD7DFE0D48}" type="datetimeFigureOut">
               <a:rPr lang="en-GB" smtClean="0"/>
-              <a:t>23/08/2018</a:t>
+              <a:t>21/09/2018</a:t>
             </a:fld>
             <a:endParaRPr lang="en-GB"/>
           </a:p>
@@ -2398,7 +2399,7 @@
           <a:p>
             <a:fld id="{8651ECA8-23E8-9342-AD68-A2BD7DFE0D48}" type="datetimeFigureOut">
               <a:rPr lang="en-GB" smtClean="0"/>
-              <a:t>23/08/2018</a:t>
+              <a:t>21/09/2018</a:t>
             </a:fld>
             <a:endParaRPr lang="en-GB"/>
           </a:p>
@@ -2687,7 +2688,7 @@
           <a:p>
             <a:fld id="{8651ECA8-23E8-9342-AD68-A2BD7DFE0D48}" type="datetimeFigureOut">
               <a:rPr lang="en-GB" smtClean="0"/>
-              <a:t>23/08/2018</a:t>
+              <a:t>21/09/2018</a:t>
             </a:fld>
             <a:endParaRPr lang="en-GB"/>
           </a:p>
@@ -2930,7 +2931,7 @@
           <a:p>
             <a:fld id="{8651ECA8-23E8-9342-AD68-A2BD7DFE0D48}" type="datetimeFigureOut">
               <a:rPr lang="en-GB" smtClean="0"/>
-              <a:t>23/08/2018</a:t>
+              <a:t>21/09/2018</a:t>
             </a:fld>
             <a:endParaRPr lang="en-GB"/>
           </a:p>
@@ -4205,6 +4206,1134 @@
 </p:sld>
 </file>
 
+<file path=ppt/slides/slide2.xml><?xml version="1.0" encoding="utf-8"?>
+<p:sld xmlns:a="http://schemas.openxmlformats.org/drawingml/2006/main" xmlns:r="http://schemas.openxmlformats.org/officeDocument/2006/relationships" xmlns:p="http://schemas.openxmlformats.org/presentationml/2006/main">
+  <p:cSld>
+    <p:spTree>
+      <p:nvGrpSpPr>
+        <p:cNvPr id="1" name=""/>
+        <p:cNvGrpSpPr/>
+        <p:nvPr/>
+      </p:nvGrpSpPr>
+      <p:grpSpPr>
+        <a:xfrm>
+          <a:off x="0" y="0"/>
+          <a:ext cx="0" cy="0"/>
+          <a:chOff x="0" y="0"/>
+          <a:chExt cx="0" cy="0"/>
+        </a:xfrm>
+      </p:grpSpPr>
+      <p:sp>
+        <p:nvSpPr>
+          <p:cNvPr id="4" name="Rounded Rectangle 3">
+            <a:extLst>
+              <a:ext uri="{FF2B5EF4-FFF2-40B4-BE49-F238E27FC236}">
+                <a16:creationId xmlns:a16="http://schemas.microsoft.com/office/drawing/2014/main" id="{F91412BB-AB0D-BE42-AF9B-6E1B03894F60}"/>
+              </a:ext>
+            </a:extLst>
+          </p:cNvPr>
+          <p:cNvSpPr/>
+          <p:nvPr/>
+        </p:nvSpPr>
+        <p:spPr>
+          <a:xfrm>
+            <a:off x="4284570" y="2679942"/>
+            <a:ext cx="1744133" cy="778934"/>
+          </a:xfrm>
+          <a:prstGeom prst="roundRect">
+            <a:avLst/>
+          </a:prstGeom>
+        </p:spPr>
+        <p:style>
+          <a:lnRef idx="2">
+            <a:schemeClr val="accent1">
+              <a:shade val="50000"/>
+            </a:schemeClr>
+          </a:lnRef>
+          <a:fillRef idx="1">
+            <a:schemeClr val="accent1"/>
+          </a:fillRef>
+          <a:effectRef idx="0">
+            <a:schemeClr val="accent1"/>
+          </a:effectRef>
+          <a:fontRef idx="minor">
+            <a:schemeClr val="lt1"/>
+          </a:fontRef>
+        </p:style>
+        <p:txBody>
+          <a:bodyPr rtlCol="0" anchor="ctr"/>
+          <a:lstStyle/>
+          <a:p>
+            <a:pPr algn="ctr"/>
+            <a:r>
+              <a:rPr lang="en-GB" sz="1200" dirty="0"/>
+              <a:t>MDR ARI CURVES </a:t>
+            </a:r>
+            <a:r>
+              <a:rPr lang="en-GB" sz="1200" dirty="0" err="1"/>
+              <a:t>stan_model_both.R</a:t>
+            </a:r>
+            <a:endParaRPr lang="en-GB" sz="1200" dirty="0"/>
+          </a:p>
+          <a:p>
+            <a:pPr algn="ctr"/>
+            <a:r>
+              <a:rPr lang="en-GB" sz="1200" i="1" dirty="0"/>
+              <a:t>Generates potential MDR ARI curves</a:t>
+            </a:r>
+          </a:p>
+        </p:txBody>
+      </p:sp>
+      <p:sp>
+        <p:nvSpPr>
+          <p:cNvPr id="5" name="Rounded Rectangle 4">
+            <a:extLst>
+              <a:ext uri="{FF2B5EF4-FFF2-40B4-BE49-F238E27FC236}">
+                <a16:creationId xmlns:a16="http://schemas.microsoft.com/office/drawing/2014/main" id="{813DB5DE-88B9-154C-B09A-65641070919B}"/>
+              </a:ext>
+            </a:extLst>
+          </p:cNvPr>
+          <p:cNvSpPr/>
+          <p:nvPr/>
+        </p:nvSpPr>
+        <p:spPr>
+          <a:xfrm>
+            <a:off x="9754107" y="2387600"/>
+            <a:ext cx="2099732" cy="728134"/>
+          </a:xfrm>
+          <a:prstGeom prst="roundRect">
+            <a:avLst/>
+          </a:prstGeom>
+          <a:solidFill>
+            <a:srgbClr val="7030A0"/>
+          </a:solidFill>
+        </p:spPr>
+        <p:style>
+          <a:lnRef idx="2">
+            <a:schemeClr val="accent1">
+              <a:shade val="50000"/>
+            </a:schemeClr>
+          </a:lnRef>
+          <a:fillRef idx="1">
+            <a:schemeClr val="accent1"/>
+          </a:fillRef>
+          <a:effectRef idx="0">
+            <a:schemeClr val="accent1"/>
+          </a:effectRef>
+          <a:fontRef idx="minor">
+            <a:schemeClr val="lt1"/>
+          </a:fontRef>
+        </p:style>
+        <p:txBody>
+          <a:bodyPr rtlCol="0" anchor="ctr"/>
+          <a:lstStyle/>
+          <a:p>
+            <a:pPr algn="ctr"/>
+            <a:r>
+              <a:rPr lang="en-GB" sz="1200" dirty="0"/>
+              <a:t>PLOT</a:t>
+            </a:r>
+          </a:p>
+          <a:p>
+            <a:pPr algn="ctr"/>
+            <a:r>
+              <a:rPr lang="en-GB" sz="1200" dirty="0" err="1"/>
+              <a:t>Data_against_need_both.R</a:t>
+            </a:r>
+            <a:endParaRPr lang="en-GB" sz="1200" dirty="0"/>
+          </a:p>
+          <a:p>
+            <a:pPr algn="ctr"/>
+            <a:r>
+              <a:rPr lang="en-GB" sz="1200" dirty="0"/>
+              <a:t>Plots metric vs. data</a:t>
+            </a:r>
+          </a:p>
+        </p:txBody>
+      </p:sp>
+      <p:sp>
+        <p:nvSpPr>
+          <p:cNvPr id="7" name="Rounded Rectangle 6">
+            <a:extLst>
+              <a:ext uri="{FF2B5EF4-FFF2-40B4-BE49-F238E27FC236}">
+                <a16:creationId xmlns:a16="http://schemas.microsoft.com/office/drawing/2014/main" id="{7EE54CA6-4A7E-0A47-A759-DDC7165DFF85}"/>
+              </a:ext>
+            </a:extLst>
+          </p:cNvPr>
+          <p:cNvSpPr/>
+          <p:nvPr/>
+        </p:nvSpPr>
+        <p:spPr>
+          <a:xfrm>
+            <a:off x="6504047" y="1817172"/>
+            <a:ext cx="2099732" cy="728134"/>
+          </a:xfrm>
+          <a:prstGeom prst="roundRect">
+            <a:avLst/>
+          </a:prstGeom>
+          <a:solidFill>
+            <a:srgbClr val="FF0000"/>
+          </a:solidFill>
+        </p:spPr>
+        <p:style>
+          <a:lnRef idx="2">
+            <a:schemeClr val="accent1">
+              <a:shade val="50000"/>
+            </a:schemeClr>
+          </a:lnRef>
+          <a:fillRef idx="1">
+            <a:schemeClr val="accent1"/>
+          </a:fillRef>
+          <a:effectRef idx="0">
+            <a:schemeClr val="accent1"/>
+          </a:effectRef>
+          <a:fontRef idx="minor">
+            <a:schemeClr val="lt1"/>
+          </a:fontRef>
+        </p:style>
+        <p:txBody>
+          <a:bodyPr rtlCol="0" anchor="ctr"/>
+          <a:lstStyle/>
+          <a:p>
+            <a:pPr algn="ctr"/>
+            <a:r>
+              <a:rPr lang="en-GB" sz="1200" dirty="0"/>
+              <a:t>MODEL</a:t>
+            </a:r>
+          </a:p>
+          <a:p>
+            <a:pPr algn="ctr"/>
+            <a:r>
+              <a:rPr lang="en-GB" sz="1200" dirty="0" err="1"/>
+              <a:t>Cohort_ltbi_mdr.R</a:t>
+            </a:r>
+            <a:endParaRPr lang="en-GB" sz="1200" dirty="0"/>
+          </a:p>
+          <a:p>
+            <a:pPr algn="ctr"/>
+            <a:r>
+              <a:rPr lang="en-GB" sz="1200" i="1" dirty="0"/>
+              <a:t>Function for cohort model</a:t>
+            </a:r>
+          </a:p>
+        </p:txBody>
+      </p:sp>
+      <p:sp>
+        <p:nvSpPr>
+          <p:cNvPr id="8" name="Rounded Rectangle 7">
+            <a:extLst>
+              <a:ext uri="{FF2B5EF4-FFF2-40B4-BE49-F238E27FC236}">
+                <a16:creationId xmlns:a16="http://schemas.microsoft.com/office/drawing/2014/main" id="{E5E4D707-5F82-054D-A384-A0516B2234F9}"/>
+              </a:ext>
+            </a:extLst>
+          </p:cNvPr>
+          <p:cNvSpPr/>
+          <p:nvPr/>
+        </p:nvSpPr>
+        <p:spPr>
+          <a:xfrm>
+            <a:off x="6504047" y="2960172"/>
+            <a:ext cx="2418280" cy="1089049"/>
+          </a:xfrm>
+          <a:prstGeom prst="roundRect">
+            <a:avLst/>
+          </a:prstGeom>
+          <a:solidFill>
+            <a:srgbClr val="FF0000"/>
+          </a:solidFill>
+        </p:spPr>
+        <p:style>
+          <a:lnRef idx="2">
+            <a:schemeClr val="accent1">
+              <a:shade val="50000"/>
+            </a:schemeClr>
+          </a:lnRef>
+          <a:fillRef idx="1">
+            <a:schemeClr val="accent1"/>
+          </a:fillRef>
+          <a:effectRef idx="0">
+            <a:schemeClr val="accent1"/>
+          </a:effectRef>
+          <a:fontRef idx="minor">
+            <a:schemeClr val="lt1"/>
+          </a:fontRef>
+        </p:style>
+        <p:txBody>
+          <a:bodyPr rtlCol="0" anchor="ctr"/>
+          <a:lstStyle/>
+          <a:p>
+            <a:pPr algn="ctr"/>
+            <a:r>
+              <a:rPr lang="en-GB" sz="1200" dirty="0"/>
+              <a:t>MODEL</a:t>
+            </a:r>
+          </a:p>
+          <a:p>
+            <a:pPr algn="ctr"/>
+            <a:r>
+              <a:rPr lang="en-GB" sz="1200" dirty="0" err="1"/>
+              <a:t>Run_cohort_ltbi_mdr_both.R</a:t>
+            </a:r>
+            <a:endParaRPr lang="en-GB" sz="1200" dirty="0"/>
+          </a:p>
+          <a:p>
+            <a:pPr algn="ctr"/>
+            <a:r>
+              <a:rPr lang="en-GB" sz="1200" i="1" dirty="0"/>
+              <a:t>Function for running cohort model – each country / age analysis</a:t>
+            </a:r>
+          </a:p>
+        </p:txBody>
+      </p:sp>
+      <p:sp>
+        <p:nvSpPr>
+          <p:cNvPr id="2" name="TextBox 1">
+            <a:extLst>
+              <a:ext uri="{FF2B5EF4-FFF2-40B4-BE49-F238E27FC236}">
+                <a16:creationId xmlns:a16="http://schemas.microsoft.com/office/drawing/2014/main" id="{429AB432-7AE3-074A-BB79-11F6109BBFFA}"/>
+              </a:ext>
+            </a:extLst>
+          </p:cNvPr>
+          <p:cNvSpPr txBox="1"/>
+          <p:nvPr/>
+        </p:nvSpPr>
+        <p:spPr>
+          <a:xfrm>
+            <a:off x="650251" y="1415111"/>
+            <a:ext cx="1778692" cy="646331"/>
+          </a:xfrm>
+          <a:prstGeom prst="rect">
+            <a:avLst/>
+          </a:prstGeom>
+        </p:spPr>
+        <p:style>
+          <a:lnRef idx="2">
+            <a:schemeClr val="accent6">
+              <a:shade val="50000"/>
+            </a:schemeClr>
+          </a:lnRef>
+          <a:fillRef idx="1">
+            <a:schemeClr val="accent6"/>
+          </a:fillRef>
+          <a:effectRef idx="0">
+            <a:schemeClr val="accent6"/>
+          </a:effectRef>
+          <a:fontRef idx="minor">
+            <a:schemeClr val="lt1"/>
+          </a:fontRef>
+        </p:style>
+        <p:txBody>
+          <a:bodyPr wrap="none" rtlCol="0">
+            <a:spAutoFit/>
+          </a:bodyPr>
+          <a:lstStyle/>
+          <a:p>
+            <a:pPr algn="ctr"/>
+            <a:r>
+              <a:rPr lang="en-US" sz="1200" dirty="0"/>
+              <a:t>ARI CURVES</a:t>
+            </a:r>
+          </a:p>
+          <a:p>
+            <a:pPr algn="ctr"/>
+            <a:r>
+              <a:rPr lang="en-US" sz="1200" dirty="0" err="1"/>
+              <a:t>Gpreg.R</a:t>
+            </a:r>
+            <a:endParaRPr lang="en-US" sz="1200" dirty="0"/>
+          </a:p>
+          <a:p>
+            <a:pPr algn="ctr"/>
+            <a:r>
+              <a:rPr lang="en-US" sz="1200" i="1" dirty="0"/>
+              <a:t>Fits GP ARI curves to data</a:t>
+            </a:r>
+          </a:p>
+        </p:txBody>
+      </p:sp>
+      <p:sp>
+        <p:nvSpPr>
+          <p:cNvPr id="9" name="TextBox 8">
+            <a:extLst>
+              <a:ext uri="{FF2B5EF4-FFF2-40B4-BE49-F238E27FC236}">
+                <a16:creationId xmlns:a16="http://schemas.microsoft.com/office/drawing/2014/main" id="{53E7CF79-1B63-034C-804C-1733A299C4D9}"/>
+              </a:ext>
+            </a:extLst>
+          </p:cNvPr>
+          <p:cNvSpPr txBox="1"/>
+          <p:nvPr/>
+        </p:nvSpPr>
+        <p:spPr>
+          <a:xfrm>
+            <a:off x="612100" y="2313841"/>
+            <a:ext cx="1854995" cy="646331"/>
+          </a:xfrm>
+          <a:prstGeom prst="rect">
+            <a:avLst/>
+          </a:prstGeom>
+        </p:spPr>
+        <p:style>
+          <a:lnRef idx="2">
+            <a:schemeClr val="accent6">
+              <a:shade val="50000"/>
+            </a:schemeClr>
+          </a:lnRef>
+          <a:fillRef idx="1">
+            <a:schemeClr val="accent6"/>
+          </a:fillRef>
+          <a:effectRef idx="0">
+            <a:schemeClr val="accent6"/>
+          </a:effectRef>
+          <a:fontRef idx="minor">
+            <a:schemeClr val="lt1"/>
+          </a:fontRef>
+        </p:style>
+        <p:txBody>
+          <a:bodyPr wrap="none" rtlCol="0">
+            <a:spAutoFit/>
+          </a:bodyPr>
+          <a:lstStyle/>
+          <a:p>
+            <a:pPr algn="ctr"/>
+            <a:r>
+              <a:rPr lang="en-US" sz="1200" dirty="0"/>
+              <a:t>RESULTS GENERATION LTBI</a:t>
+            </a:r>
+          </a:p>
+          <a:p>
+            <a:pPr algn="ctr"/>
+            <a:r>
+              <a:rPr lang="en-US" sz="1200" dirty="0" err="1"/>
+              <a:t>postARIanalysis_mdr.R</a:t>
+            </a:r>
+            <a:endParaRPr lang="en-US" sz="1200" dirty="0"/>
+          </a:p>
+          <a:p>
+            <a:pPr algn="ctr"/>
+            <a:r>
+              <a:rPr lang="en-US" sz="1200" i="1" dirty="0"/>
+              <a:t>Works out LTBI levels </a:t>
+            </a:r>
+          </a:p>
+        </p:txBody>
+      </p:sp>
+      <p:cxnSp>
+        <p:nvCxnSpPr>
+          <p:cNvPr id="11" name="Straight Arrow Connector 10">
+            <a:extLst>
+              <a:ext uri="{FF2B5EF4-FFF2-40B4-BE49-F238E27FC236}">
+                <a16:creationId xmlns:a16="http://schemas.microsoft.com/office/drawing/2014/main" id="{26648658-A8D2-DC4E-BA82-978EC2C89A8E}"/>
+              </a:ext>
+            </a:extLst>
+          </p:cNvPr>
+          <p:cNvCxnSpPr>
+            <a:cxnSpLocks/>
+          </p:cNvCxnSpPr>
+          <p:nvPr/>
+        </p:nvCxnSpPr>
+        <p:spPr>
+          <a:xfrm>
+            <a:off x="2259146" y="923794"/>
+            <a:ext cx="1" cy="252399"/>
+          </a:xfrm>
+          <a:prstGeom prst="straightConnector1">
+            <a:avLst/>
+          </a:prstGeom>
+          <a:ln>
+            <a:solidFill>
+              <a:schemeClr val="accent6"/>
+            </a:solidFill>
+            <a:tailEnd type="triangle"/>
+          </a:ln>
+        </p:spPr>
+        <p:style>
+          <a:lnRef idx="1">
+            <a:schemeClr val="accent1"/>
+          </a:lnRef>
+          <a:fillRef idx="0">
+            <a:schemeClr val="accent1"/>
+          </a:fillRef>
+          <a:effectRef idx="0">
+            <a:schemeClr val="accent1"/>
+          </a:effectRef>
+          <a:fontRef idx="minor">
+            <a:schemeClr val="tx1"/>
+          </a:fontRef>
+        </p:style>
+      </p:cxnSp>
+      <p:sp>
+        <p:nvSpPr>
+          <p:cNvPr id="12" name="TextBox 11">
+            <a:extLst>
+              <a:ext uri="{FF2B5EF4-FFF2-40B4-BE49-F238E27FC236}">
+                <a16:creationId xmlns:a16="http://schemas.microsoft.com/office/drawing/2014/main" id="{B65741B3-DA98-4E4E-AD2D-F455847AA588}"/>
+              </a:ext>
+            </a:extLst>
+          </p:cNvPr>
+          <p:cNvSpPr txBox="1"/>
+          <p:nvPr/>
+        </p:nvSpPr>
+        <p:spPr>
+          <a:xfrm>
+            <a:off x="278137" y="491317"/>
+            <a:ext cx="2522935" cy="646331"/>
+          </a:xfrm>
+          <a:prstGeom prst="rect">
+            <a:avLst/>
+          </a:prstGeom>
+        </p:spPr>
+        <p:style>
+          <a:lnRef idx="2">
+            <a:schemeClr val="accent6">
+              <a:shade val="50000"/>
+            </a:schemeClr>
+          </a:lnRef>
+          <a:fillRef idx="1">
+            <a:schemeClr val="accent6"/>
+          </a:fillRef>
+          <a:effectRef idx="0">
+            <a:schemeClr val="accent6"/>
+          </a:effectRef>
+          <a:fontRef idx="minor">
+            <a:schemeClr val="lt1"/>
+          </a:fontRef>
+        </p:style>
+        <p:txBody>
+          <a:bodyPr wrap="none" rtlCol="0">
+            <a:spAutoFit/>
+          </a:bodyPr>
+          <a:lstStyle/>
+          <a:p>
+            <a:pPr algn="ctr"/>
+            <a:r>
+              <a:rPr lang="en-US" sz="1200" dirty="0"/>
+              <a:t>DATA PREP</a:t>
+            </a:r>
+          </a:p>
+          <a:p>
+            <a:pPr algn="ctr"/>
+            <a:r>
+              <a:rPr lang="en-US" sz="1200" dirty="0" err="1"/>
+              <a:t>Data_prep.R</a:t>
+            </a:r>
+            <a:endParaRPr lang="en-US" sz="1200" dirty="0"/>
+          </a:p>
+          <a:p>
+            <a:pPr algn="ctr"/>
+            <a:r>
+              <a:rPr lang="en-US" sz="1200" i="1" dirty="0"/>
+              <a:t>Gathers all ARI data and adds in MDR</a:t>
+            </a:r>
+          </a:p>
+        </p:txBody>
+      </p:sp>
+      <p:cxnSp>
+        <p:nvCxnSpPr>
+          <p:cNvPr id="13" name="Straight Arrow Connector 12">
+            <a:extLst>
+              <a:ext uri="{FF2B5EF4-FFF2-40B4-BE49-F238E27FC236}">
+                <a16:creationId xmlns:a16="http://schemas.microsoft.com/office/drawing/2014/main" id="{7B2EDEDB-38E5-4748-8AE5-021D34E3D767}"/>
+              </a:ext>
+            </a:extLst>
+          </p:cNvPr>
+          <p:cNvCxnSpPr>
+            <a:cxnSpLocks/>
+          </p:cNvCxnSpPr>
+          <p:nvPr/>
+        </p:nvCxnSpPr>
+        <p:spPr>
+          <a:xfrm flipH="1">
+            <a:off x="2259146" y="0"/>
+            <a:ext cx="8" cy="277463"/>
+          </a:xfrm>
+          <a:prstGeom prst="straightConnector1">
+            <a:avLst/>
+          </a:prstGeom>
+          <a:ln>
+            <a:solidFill>
+              <a:schemeClr val="accent6"/>
+            </a:solidFill>
+            <a:tailEnd type="triangle"/>
+          </a:ln>
+        </p:spPr>
+        <p:style>
+          <a:lnRef idx="1">
+            <a:schemeClr val="accent1"/>
+          </a:lnRef>
+          <a:fillRef idx="0">
+            <a:schemeClr val="accent1"/>
+          </a:fillRef>
+          <a:effectRef idx="0">
+            <a:schemeClr val="accent1"/>
+          </a:effectRef>
+          <a:fontRef idx="minor">
+            <a:schemeClr val="tx1"/>
+          </a:fontRef>
+        </p:style>
+      </p:cxnSp>
+      <p:sp>
+        <p:nvSpPr>
+          <p:cNvPr id="18" name="TextBox 17">
+            <a:extLst>
+              <a:ext uri="{FF2B5EF4-FFF2-40B4-BE49-F238E27FC236}">
+                <a16:creationId xmlns:a16="http://schemas.microsoft.com/office/drawing/2014/main" id="{5B035FA4-6B01-7549-8FE6-E5A8D414AE77}"/>
+              </a:ext>
+            </a:extLst>
+          </p:cNvPr>
+          <p:cNvSpPr txBox="1"/>
+          <p:nvPr/>
+        </p:nvSpPr>
+        <p:spPr>
+          <a:xfrm>
+            <a:off x="1225248" y="58738"/>
+            <a:ext cx="638316" cy="369332"/>
+          </a:xfrm>
+          <a:prstGeom prst="rect">
+            <a:avLst/>
+          </a:prstGeom>
+          <a:noFill/>
+        </p:spPr>
+        <p:txBody>
+          <a:bodyPr wrap="none" rtlCol="0">
+            <a:spAutoFit/>
+          </a:bodyPr>
+          <a:lstStyle/>
+          <a:p>
+            <a:r>
+              <a:rPr lang="en-US" b="1" dirty="0">
+                <a:solidFill>
+                  <a:schemeClr val="accent6"/>
+                </a:solidFill>
+              </a:rPr>
+              <a:t>H&amp;D</a:t>
+            </a:r>
+          </a:p>
+        </p:txBody>
+      </p:sp>
+      <p:sp>
+        <p:nvSpPr>
+          <p:cNvPr id="19" name="Rounded Rectangle 18">
+            <a:extLst>
+              <a:ext uri="{FF2B5EF4-FFF2-40B4-BE49-F238E27FC236}">
+                <a16:creationId xmlns:a16="http://schemas.microsoft.com/office/drawing/2014/main" id="{A4AD3340-4AAA-E848-B5C7-4CC2C87547E2}"/>
+              </a:ext>
+            </a:extLst>
+          </p:cNvPr>
+          <p:cNvSpPr/>
+          <p:nvPr/>
+        </p:nvSpPr>
+        <p:spPr>
+          <a:xfrm>
+            <a:off x="518217" y="3568787"/>
+            <a:ext cx="2424222" cy="960868"/>
+          </a:xfrm>
+          <a:prstGeom prst="roundRect">
+            <a:avLst/>
+          </a:prstGeom>
+        </p:spPr>
+        <p:style>
+          <a:lnRef idx="2">
+            <a:schemeClr val="accent1">
+              <a:shade val="50000"/>
+            </a:schemeClr>
+          </a:lnRef>
+          <a:fillRef idx="1">
+            <a:schemeClr val="accent1"/>
+          </a:fillRef>
+          <a:effectRef idx="0">
+            <a:schemeClr val="accent1"/>
+          </a:effectRef>
+          <a:fontRef idx="minor">
+            <a:schemeClr val="lt1"/>
+          </a:fontRef>
+        </p:style>
+        <p:txBody>
+          <a:bodyPr rtlCol="0" anchor="ctr"/>
+          <a:lstStyle/>
+          <a:p>
+            <a:pPr algn="ctr"/>
+            <a:r>
+              <a:rPr lang="en-GB" sz="1200" dirty="0"/>
+              <a:t>WHICH COUNTRIES?</a:t>
+            </a:r>
+          </a:p>
+          <a:p>
+            <a:pPr algn="ctr"/>
+            <a:r>
+              <a:rPr lang="en-GB" sz="1200" dirty="0" err="1"/>
+              <a:t>Countries_included.R</a:t>
+            </a:r>
+            <a:endParaRPr lang="en-GB" sz="1200" dirty="0"/>
+          </a:p>
+          <a:p>
+            <a:pPr algn="ctr"/>
+            <a:r>
+              <a:rPr lang="en-GB" sz="1200" i="1" dirty="0"/>
+              <a:t>Looks at country list, calculates %, writes out </a:t>
+            </a:r>
+            <a:r>
+              <a:rPr lang="en-GB" sz="1200" i="1" dirty="0" err="1"/>
+              <a:t>new_who_edited_sub.csv</a:t>
+            </a:r>
+            <a:endParaRPr lang="en-GB" sz="1200" i="1" dirty="0"/>
+          </a:p>
+        </p:txBody>
+      </p:sp>
+      <p:sp>
+        <p:nvSpPr>
+          <p:cNvPr id="20" name="TextBox 19">
+            <a:extLst>
+              <a:ext uri="{FF2B5EF4-FFF2-40B4-BE49-F238E27FC236}">
+                <a16:creationId xmlns:a16="http://schemas.microsoft.com/office/drawing/2014/main" id="{FD71F4F9-D8E6-5144-99DD-80D55C773504}"/>
+              </a:ext>
+            </a:extLst>
+          </p:cNvPr>
+          <p:cNvSpPr txBox="1"/>
+          <p:nvPr/>
+        </p:nvSpPr>
+        <p:spPr>
+          <a:xfrm>
+            <a:off x="2467095" y="1345539"/>
+            <a:ext cx="1066320" cy="830997"/>
+          </a:xfrm>
+          <a:prstGeom prst="rect">
+            <a:avLst/>
+          </a:prstGeom>
+        </p:spPr>
+        <p:style>
+          <a:lnRef idx="2">
+            <a:schemeClr val="accent6">
+              <a:shade val="50000"/>
+            </a:schemeClr>
+          </a:lnRef>
+          <a:fillRef idx="1">
+            <a:schemeClr val="accent6"/>
+          </a:fillRef>
+          <a:effectRef idx="0">
+            <a:schemeClr val="accent6"/>
+          </a:effectRef>
+          <a:fontRef idx="minor">
+            <a:schemeClr val="lt1"/>
+          </a:fontRef>
+        </p:style>
+        <p:txBody>
+          <a:bodyPr wrap="square" rtlCol="0">
+            <a:spAutoFit/>
+          </a:bodyPr>
+          <a:lstStyle/>
+          <a:p>
+            <a:pPr algn="ctr"/>
+            <a:r>
+              <a:rPr lang="en-US" sz="1200" dirty="0"/>
+              <a:t>Not </a:t>
+            </a:r>
+            <a:r>
+              <a:rPr lang="en-US" sz="1200" dirty="0" err="1"/>
+              <a:t>Gpreg.R_mdr</a:t>
+            </a:r>
+            <a:r>
+              <a:rPr lang="en-US" sz="1200" dirty="0"/>
+              <a:t>: can add in in </a:t>
+            </a:r>
+            <a:r>
+              <a:rPr lang="en-US" sz="1200" dirty="0" err="1"/>
+              <a:t>postARI</a:t>
+            </a:r>
+            <a:endParaRPr lang="en-US" sz="1200" i="1" dirty="0"/>
+          </a:p>
+        </p:txBody>
+      </p:sp>
+      <p:sp>
+        <p:nvSpPr>
+          <p:cNvPr id="3" name="TextBox 2">
+            <a:extLst>
+              <a:ext uri="{FF2B5EF4-FFF2-40B4-BE49-F238E27FC236}">
+                <a16:creationId xmlns:a16="http://schemas.microsoft.com/office/drawing/2014/main" id="{1B6C38F1-1F4F-D04E-ABE9-B29623C5BCDA}"/>
+              </a:ext>
+            </a:extLst>
+          </p:cNvPr>
+          <p:cNvSpPr txBox="1"/>
+          <p:nvPr/>
+        </p:nvSpPr>
+        <p:spPr>
+          <a:xfrm>
+            <a:off x="4202721" y="2313841"/>
+            <a:ext cx="971548" cy="369332"/>
+          </a:xfrm>
+          <a:prstGeom prst="rect">
+            <a:avLst/>
+          </a:prstGeom>
+          <a:noFill/>
+        </p:spPr>
+        <p:txBody>
+          <a:bodyPr wrap="none" rtlCol="0">
+            <a:spAutoFit/>
+          </a:bodyPr>
+          <a:lstStyle/>
+          <a:p>
+            <a:r>
+              <a:rPr lang="en-US" b="1" dirty="0"/>
+              <a:t>Desktop</a:t>
+            </a:r>
+          </a:p>
+        </p:txBody>
+      </p:sp>
+      <p:sp>
+        <p:nvSpPr>
+          <p:cNvPr id="15" name="TextBox 14">
+            <a:extLst>
+              <a:ext uri="{FF2B5EF4-FFF2-40B4-BE49-F238E27FC236}">
+                <a16:creationId xmlns:a16="http://schemas.microsoft.com/office/drawing/2014/main" id="{0BA10B5E-AAC6-E740-B664-7CC3368D1858}"/>
+              </a:ext>
+            </a:extLst>
+          </p:cNvPr>
+          <p:cNvSpPr txBox="1"/>
+          <p:nvPr/>
+        </p:nvSpPr>
+        <p:spPr>
+          <a:xfrm>
+            <a:off x="6488940" y="1402306"/>
+            <a:ext cx="849335" cy="369332"/>
+          </a:xfrm>
+          <a:prstGeom prst="rect">
+            <a:avLst/>
+          </a:prstGeom>
+          <a:noFill/>
+        </p:spPr>
+        <p:txBody>
+          <a:bodyPr wrap="none" rtlCol="0">
+            <a:spAutoFit/>
+          </a:bodyPr>
+          <a:lstStyle/>
+          <a:p>
+            <a:r>
+              <a:rPr lang="en-US" b="1" dirty="0"/>
+              <a:t>Cluster</a:t>
+            </a:r>
+          </a:p>
+        </p:txBody>
+      </p:sp>
+      <p:sp>
+        <p:nvSpPr>
+          <p:cNvPr id="6" name="TextBox 5">
+            <a:extLst>
+              <a:ext uri="{FF2B5EF4-FFF2-40B4-BE49-F238E27FC236}">
+                <a16:creationId xmlns:a16="http://schemas.microsoft.com/office/drawing/2014/main" id="{E38133A6-26C8-2E4A-B0A7-7B7C62755201}"/>
+              </a:ext>
+            </a:extLst>
+          </p:cNvPr>
+          <p:cNvSpPr txBox="1"/>
+          <p:nvPr/>
+        </p:nvSpPr>
+        <p:spPr>
+          <a:xfrm>
+            <a:off x="6223324" y="4049221"/>
+            <a:ext cx="2979726" cy="369332"/>
+          </a:xfrm>
+          <a:prstGeom prst="rect">
+            <a:avLst/>
+          </a:prstGeom>
+          <a:noFill/>
+        </p:spPr>
+        <p:txBody>
+          <a:bodyPr wrap="none" rtlCol="0">
+            <a:spAutoFit/>
+          </a:bodyPr>
+          <a:lstStyle/>
+          <a:p>
+            <a:r>
+              <a:rPr lang="en-US" dirty="0"/>
+              <a:t>Gives </a:t>
+            </a:r>
+            <a:r>
+              <a:rPr lang="en-US" dirty="0" err="1"/>
+              <a:t>s_level</a:t>
+            </a:r>
+            <a:r>
+              <a:rPr lang="en-US" dirty="0"/>
+              <a:t> for each country</a:t>
+            </a:r>
+          </a:p>
+        </p:txBody>
+      </p:sp>
+      <p:sp>
+        <p:nvSpPr>
+          <p:cNvPr id="17" name="Rounded Rectangle 16">
+            <a:extLst>
+              <a:ext uri="{FF2B5EF4-FFF2-40B4-BE49-F238E27FC236}">
+                <a16:creationId xmlns:a16="http://schemas.microsoft.com/office/drawing/2014/main" id="{B81A2DDC-351C-5943-A0D5-797534FE3F91}"/>
+              </a:ext>
+            </a:extLst>
+          </p:cNvPr>
+          <p:cNvSpPr/>
+          <p:nvPr/>
+        </p:nvSpPr>
+        <p:spPr>
+          <a:xfrm>
+            <a:off x="6504047" y="4487310"/>
+            <a:ext cx="2418280" cy="1089049"/>
+          </a:xfrm>
+          <a:prstGeom prst="roundRect">
+            <a:avLst/>
+          </a:prstGeom>
+          <a:solidFill>
+            <a:srgbClr val="FF0000"/>
+          </a:solidFill>
+        </p:spPr>
+        <p:style>
+          <a:lnRef idx="2">
+            <a:schemeClr val="accent1">
+              <a:shade val="50000"/>
+            </a:schemeClr>
+          </a:lnRef>
+          <a:fillRef idx="1">
+            <a:schemeClr val="accent1"/>
+          </a:fillRef>
+          <a:effectRef idx="0">
+            <a:schemeClr val="accent1"/>
+          </a:effectRef>
+          <a:fontRef idx="minor">
+            <a:schemeClr val="lt1"/>
+          </a:fontRef>
+        </p:style>
+        <p:txBody>
+          <a:bodyPr rtlCol="0" anchor="ctr"/>
+          <a:lstStyle/>
+          <a:p>
+            <a:pPr algn="ctr"/>
+            <a:r>
+              <a:rPr lang="en-GB" sz="1200" dirty="0"/>
+              <a:t>Combine</a:t>
+            </a:r>
+          </a:p>
+          <a:p>
+            <a:pPr algn="ctr"/>
+            <a:r>
+              <a:rPr lang="en-GB" sz="1200" dirty="0" err="1"/>
+              <a:t>Combine_run_cohort_c.R</a:t>
+            </a:r>
+            <a:endParaRPr lang="en-GB" sz="1200" dirty="0"/>
+          </a:p>
+          <a:p>
+            <a:pPr algn="ctr"/>
+            <a:r>
+              <a:rPr lang="en-GB" sz="1200" i="1" dirty="0"/>
+              <a:t>Combine the </a:t>
+            </a:r>
+            <a:r>
+              <a:rPr lang="en-GB" sz="1200" i="1" dirty="0" err="1"/>
+              <a:t>s_level</a:t>
+            </a:r>
+            <a:r>
+              <a:rPr lang="en-GB" sz="1200" i="1" dirty="0"/>
+              <a:t> for each country and plots</a:t>
+            </a:r>
+          </a:p>
+        </p:txBody>
+      </p:sp>
+      <p:sp>
+        <p:nvSpPr>
+          <p:cNvPr id="21" name="TextBox 20">
+            <a:extLst>
+              <a:ext uri="{FF2B5EF4-FFF2-40B4-BE49-F238E27FC236}">
+                <a16:creationId xmlns:a16="http://schemas.microsoft.com/office/drawing/2014/main" id="{DDB7E1E0-FC09-E34B-AD70-39DFD42FF981}"/>
+              </a:ext>
+            </a:extLst>
+          </p:cNvPr>
+          <p:cNvSpPr txBox="1"/>
+          <p:nvPr/>
+        </p:nvSpPr>
+        <p:spPr>
+          <a:xfrm>
+            <a:off x="6504047" y="5645116"/>
+            <a:ext cx="2487156" cy="369332"/>
+          </a:xfrm>
+          <a:prstGeom prst="rect">
+            <a:avLst/>
+          </a:prstGeom>
+          <a:noFill/>
+        </p:spPr>
+        <p:txBody>
+          <a:bodyPr wrap="none" rtlCol="0">
+            <a:spAutoFit/>
+          </a:bodyPr>
+          <a:lstStyle/>
+          <a:p>
+            <a:r>
+              <a:rPr lang="en-US" dirty="0"/>
+              <a:t>Gives aggregated </a:t>
+            </a:r>
+            <a:r>
+              <a:rPr lang="en-US" dirty="0" err="1"/>
+              <a:t>s_level</a:t>
+            </a:r>
+            <a:endParaRPr lang="en-US" dirty="0"/>
+          </a:p>
+        </p:txBody>
+      </p:sp>
+      <p:sp>
+        <p:nvSpPr>
+          <p:cNvPr id="10" name="TextBox 9">
+            <a:extLst>
+              <a:ext uri="{FF2B5EF4-FFF2-40B4-BE49-F238E27FC236}">
+                <a16:creationId xmlns:a16="http://schemas.microsoft.com/office/drawing/2014/main" id="{50291193-6635-D544-A89F-872874DF3B1D}"/>
+              </a:ext>
+            </a:extLst>
+          </p:cNvPr>
+          <p:cNvSpPr txBox="1"/>
+          <p:nvPr/>
+        </p:nvSpPr>
+        <p:spPr>
+          <a:xfrm>
+            <a:off x="9334688" y="1368944"/>
+            <a:ext cx="2519151" cy="369332"/>
+          </a:xfrm>
+          <a:prstGeom prst="rect">
+            <a:avLst/>
+          </a:prstGeom>
+          <a:noFill/>
+        </p:spPr>
+        <p:txBody>
+          <a:bodyPr wrap="none" rtlCol="0">
+            <a:spAutoFit/>
+          </a:bodyPr>
+          <a:lstStyle/>
+          <a:p>
+            <a:r>
+              <a:rPr lang="en-US" dirty="0"/>
+              <a:t>Move </a:t>
+            </a:r>
+            <a:r>
+              <a:rPr lang="en-US" dirty="0" err="1"/>
+              <a:t>s_level</a:t>
+            </a:r>
+            <a:r>
+              <a:rPr lang="en-US" dirty="0"/>
+              <a:t> to Dropbox</a:t>
+            </a:r>
+          </a:p>
+        </p:txBody>
+      </p:sp>
+      <p:sp>
+        <p:nvSpPr>
+          <p:cNvPr id="24" name="TextBox 23">
+            <a:extLst>
+              <a:ext uri="{FF2B5EF4-FFF2-40B4-BE49-F238E27FC236}">
+                <a16:creationId xmlns:a16="http://schemas.microsoft.com/office/drawing/2014/main" id="{1B69F55E-D9C0-CC4A-98A7-27901D67F712}"/>
+              </a:ext>
+            </a:extLst>
+          </p:cNvPr>
+          <p:cNvSpPr txBox="1"/>
+          <p:nvPr/>
+        </p:nvSpPr>
+        <p:spPr>
+          <a:xfrm>
+            <a:off x="9640348" y="1991870"/>
+            <a:ext cx="971548" cy="369332"/>
+          </a:xfrm>
+          <a:prstGeom prst="rect">
+            <a:avLst/>
+          </a:prstGeom>
+          <a:noFill/>
+        </p:spPr>
+        <p:txBody>
+          <a:bodyPr wrap="none" rtlCol="0">
+            <a:spAutoFit/>
+          </a:bodyPr>
+          <a:lstStyle/>
+          <a:p>
+            <a:r>
+              <a:rPr lang="en-US" b="1" dirty="0"/>
+              <a:t>Desktop</a:t>
+            </a:r>
+          </a:p>
+        </p:txBody>
+      </p:sp>
+      <p:sp>
+        <p:nvSpPr>
+          <p:cNvPr id="26" name="Rounded Rectangle 25">
+            <a:extLst>
+              <a:ext uri="{FF2B5EF4-FFF2-40B4-BE49-F238E27FC236}">
+                <a16:creationId xmlns:a16="http://schemas.microsoft.com/office/drawing/2014/main" id="{FBC6246C-F360-8A42-A629-8329E5A5116E}"/>
+              </a:ext>
+            </a:extLst>
+          </p:cNvPr>
+          <p:cNvSpPr/>
+          <p:nvPr/>
+        </p:nvSpPr>
+        <p:spPr>
+          <a:xfrm>
+            <a:off x="9754107" y="3321087"/>
+            <a:ext cx="2099732" cy="728134"/>
+          </a:xfrm>
+          <a:prstGeom prst="roundRect">
+            <a:avLst/>
+          </a:prstGeom>
+          <a:solidFill>
+            <a:srgbClr val="7030A0"/>
+          </a:solidFill>
+        </p:spPr>
+        <p:style>
+          <a:lnRef idx="2">
+            <a:schemeClr val="accent1">
+              <a:shade val="50000"/>
+            </a:schemeClr>
+          </a:lnRef>
+          <a:fillRef idx="1">
+            <a:schemeClr val="accent1"/>
+          </a:fillRef>
+          <a:effectRef idx="0">
+            <a:schemeClr val="accent1"/>
+          </a:effectRef>
+          <a:fontRef idx="minor">
+            <a:schemeClr val="lt1"/>
+          </a:fontRef>
+        </p:style>
+        <p:txBody>
+          <a:bodyPr rtlCol="0" anchor="ctr"/>
+          <a:lstStyle/>
+          <a:p>
+            <a:pPr algn="ctr"/>
+            <a:r>
+              <a:rPr lang="en-GB" sz="1200" dirty="0"/>
+              <a:t>Outputs</a:t>
+            </a:r>
+          </a:p>
+          <a:p>
+            <a:pPr algn="ctr"/>
+            <a:r>
+              <a:rPr lang="en-GB" sz="1200" dirty="0" err="1"/>
+              <a:t>Output_production.R</a:t>
+            </a:r>
+            <a:endParaRPr lang="en-GB" sz="1200" dirty="0"/>
+          </a:p>
+          <a:p>
+            <a:pPr algn="ctr"/>
+            <a:r>
+              <a:rPr lang="en-GB" sz="1200" dirty="0"/>
+              <a:t>Generates tables </a:t>
+            </a:r>
+            <a:r>
+              <a:rPr lang="en-GB" sz="1200"/>
+              <a:t>and plots</a:t>
+            </a:r>
+            <a:endParaRPr lang="en-GB" sz="1200" dirty="0"/>
+          </a:p>
+        </p:txBody>
+      </p:sp>
+    </p:spTree>
+    <p:extLst>
+      <p:ext uri="{BB962C8B-B14F-4D97-AF65-F5344CB8AC3E}">
+        <p14:creationId xmlns:p14="http://schemas.microsoft.com/office/powerpoint/2010/main" val="2556954418"/>
+      </p:ext>
+    </p:extLst>
+  </p:cSld>
+  <p:clrMapOvr>
+    <a:masterClrMapping/>
+  </p:clrMapOvr>
+</p:sld>
+</file>
+
 <file path=ppt/theme/theme1.xml><?xml version="1.0" encoding="utf-8"?>
 <a:theme xmlns:a="http://schemas.openxmlformats.org/drawingml/2006/main" name="Office Theme">
   <a:themeElements>

</xml_diff>